<commit_message>
Update figure 7 and figure 8
</commit_message>
<xml_diff>
--- a/Figures/Figure_7/Figure_7.pptx
+++ b/Figures/Figure_7/Figure_7.pptx
@@ -3542,12 +3542,82 @@
           </a:prstGeom>
         </p:spPr>
       </p:pic>
+      <p:sp>
+        <p:nvSpPr>
+          <p:cNvPr id="23" name="TextBox 22">
+            <a:extLst>
+              <a:ext uri="{FF2B5EF4-FFF2-40B4-BE49-F238E27FC236}">
+                <a16:creationId xmlns:a16="http://schemas.microsoft.com/office/drawing/2014/main" id="{9C7FA604-C140-15D5-6133-F229FFD2D3C2}"/>
+              </a:ext>
+            </a:extLst>
+          </p:cNvPr>
+          <p:cNvSpPr txBox="1"/>
+          <p:nvPr/>
+        </p:nvSpPr>
+        <p:spPr>
+          <a:xfrm>
+            <a:off x="1052601" y="16265964"/>
+            <a:ext cx="925253" cy="2215991"/>
+          </a:xfrm>
+          <a:prstGeom prst="rect">
+            <a:avLst/>
+          </a:prstGeom>
+          <a:noFill/>
+        </p:spPr>
+        <p:txBody>
+          <a:bodyPr wrap="none" rtlCol="0">
+            <a:spAutoFit/>
+          </a:bodyPr>
+          <a:lstStyle/>
+          <a:p>
+            <a:r>
+              <a:rPr lang="en-US" sz="13800" b="1" dirty="0"/>
+              <a:t>c</a:t>
+            </a:r>
+          </a:p>
+        </p:txBody>
+      </p:sp>
+      <p:sp>
+        <p:nvSpPr>
+          <p:cNvPr id="24" name="TextBox 23">
+            <a:extLst>
+              <a:ext uri="{FF2B5EF4-FFF2-40B4-BE49-F238E27FC236}">
+                <a16:creationId xmlns:a16="http://schemas.microsoft.com/office/drawing/2014/main" id="{E4849DC1-2326-4C2D-D2F0-B51750BD9ABC}"/>
+              </a:ext>
+            </a:extLst>
+          </p:cNvPr>
+          <p:cNvSpPr txBox="1"/>
+          <p:nvPr/>
+        </p:nvSpPr>
+        <p:spPr>
+          <a:xfrm>
+            <a:off x="21956218" y="16265964"/>
+            <a:ext cx="1133644" cy="2215991"/>
+          </a:xfrm>
+          <a:prstGeom prst="rect">
+            <a:avLst/>
+          </a:prstGeom>
+          <a:noFill/>
+        </p:spPr>
+        <p:txBody>
+          <a:bodyPr wrap="none" rtlCol="0">
+            <a:spAutoFit/>
+          </a:bodyPr>
+          <a:lstStyle/>
+          <a:p>
+            <a:r>
+              <a:rPr lang="en-US" sz="13800" b="1" dirty="0"/>
+              <a:t>d</a:t>
+            </a:r>
+          </a:p>
+        </p:txBody>
+      </p:sp>
       <p:pic>
         <p:nvPicPr>
-          <p:cNvPr id="14" name="Picture 13" descr="A picture containing text, screenshot, diagram, line&#10;&#10;Description automatically generated">
+          <p:cNvPr id="3" name="Picture 2" descr="A picture containing text, screenshot, line, diagram&#10;&#10;Description automatically generated">
             <a:extLst>
               <a:ext uri="{FF2B5EF4-FFF2-40B4-BE49-F238E27FC236}">
-                <a16:creationId xmlns:a16="http://schemas.microsoft.com/office/drawing/2014/main" id="{B4CC73D7-2DF6-0157-1503-7C0E5A6A9ADF}"/>
+                <a16:creationId xmlns:a16="http://schemas.microsoft.com/office/drawing/2014/main" id="{45B0C888-577D-A892-22B2-3ADCACE972A0}"/>
               </a:ext>
             </a:extLst>
           </p:cNvPr>
@@ -3564,7 +3634,7 @@
         </p:blipFill>
         <p:spPr>
           <a:xfrm>
-            <a:off x="878429" y="560055"/>
+            <a:off x="1049956" y="722860"/>
             <a:ext cx="21066740" cy="15800055"/>
           </a:xfrm>
           <a:prstGeom prst="rect">
@@ -3574,10 +3644,10 @@
       </p:pic>
       <p:pic>
         <p:nvPicPr>
-          <p:cNvPr id="18" name="Picture 17" descr="A picture containing text, screenshot, line, diagram&#10;&#10;Description automatically generated">
+          <p:cNvPr id="5" name="Picture 4" descr="A picture containing text, screenshot, line, diagram&#10;&#10;Description automatically generated">
             <a:extLst>
               <a:ext uri="{FF2B5EF4-FFF2-40B4-BE49-F238E27FC236}">
-                <a16:creationId xmlns:a16="http://schemas.microsoft.com/office/drawing/2014/main" id="{2E67E3D0-6DA0-5337-BC33-5835E2A5A53C}"/>
+                <a16:creationId xmlns:a16="http://schemas.microsoft.com/office/drawing/2014/main" id="{BFAC5698-361F-1FC1-6925-13F10A137122}"/>
               </a:ext>
             </a:extLst>
           </p:cNvPr>
@@ -3594,7 +3664,7 @@
         </p:blipFill>
         <p:spPr>
           <a:xfrm>
-            <a:off x="21904227" y="560055"/>
+            <a:off x="21853912" y="722860"/>
             <a:ext cx="21066740" cy="15800055"/>
           </a:xfrm>
           <a:prstGeom prst="rect">
@@ -3604,10 +3674,10 @@
       </p:pic>
       <p:sp>
         <p:nvSpPr>
-          <p:cNvPr id="21" name="TextBox 20">
+          <p:cNvPr id="6" name="TextBox 5">
             <a:extLst>
               <a:ext uri="{FF2B5EF4-FFF2-40B4-BE49-F238E27FC236}">
-                <a16:creationId xmlns:a16="http://schemas.microsoft.com/office/drawing/2014/main" id="{FFC66617-B539-DE5E-C794-370C384151E9}"/>
+                <a16:creationId xmlns:a16="http://schemas.microsoft.com/office/drawing/2014/main" id="{831A4C5F-9BFA-072E-0F66-6B53F969E83A}"/>
               </a:ext>
             </a:extLst>
           </p:cNvPr>
@@ -3639,10 +3709,10 @@
       </p:sp>
       <p:sp>
         <p:nvSpPr>
-          <p:cNvPr id="22" name="TextBox 21">
+          <p:cNvPr id="7" name="TextBox 6">
             <a:extLst>
               <a:ext uri="{FF2B5EF4-FFF2-40B4-BE49-F238E27FC236}">
-                <a16:creationId xmlns:a16="http://schemas.microsoft.com/office/drawing/2014/main" id="{2A13D69D-DAE0-D1DA-9709-60E73205B1A6}"/>
+                <a16:creationId xmlns:a16="http://schemas.microsoft.com/office/drawing/2014/main" id="{13C31D1A-738B-7FDC-C4BE-76539143ED19}"/>
               </a:ext>
             </a:extLst>
           </p:cNvPr>
@@ -3668,76 +3738,6 @@
             <a:r>
               <a:rPr lang="en-US" sz="13800" b="1" dirty="0"/>
               <a:t>b</a:t>
-            </a:r>
-          </a:p>
-        </p:txBody>
-      </p:sp>
-      <p:sp>
-        <p:nvSpPr>
-          <p:cNvPr id="23" name="TextBox 22">
-            <a:extLst>
-              <a:ext uri="{FF2B5EF4-FFF2-40B4-BE49-F238E27FC236}">
-                <a16:creationId xmlns:a16="http://schemas.microsoft.com/office/drawing/2014/main" id="{9C7FA604-C140-15D5-6133-F229FFD2D3C2}"/>
-              </a:ext>
-            </a:extLst>
-          </p:cNvPr>
-          <p:cNvSpPr txBox="1"/>
-          <p:nvPr/>
-        </p:nvSpPr>
-        <p:spPr>
-          <a:xfrm>
-            <a:off x="1052601" y="16265964"/>
-            <a:ext cx="925253" cy="2215991"/>
-          </a:xfrm>
-          <a:prstGeom prst="rect">
-            <a:avLst/>
-          </a:prstGeom>
-          <a:noFill/>
-        </p:spPr>
-        <p:txBody>
-          <a:bodyPr wrap="none" rtlCol="0">
-            <a:spAutoFit/>
-          </a:bodyPr>
-          <a:lstStyle/>
-          <a:p>
-            <a:r>
-              <a:rPr lang="en-US" sz="13800" b="1" dirty="0"/>
-              <a:t>c</a:t>
-            </a:r>
-          </a:p>
-        </p:txBody>
-      </p:sp>
-      <p:sp>
-        <p:nvSpPr>
-          <p:cNvPr id="24" name="TextBox 23">
-            <a:extLst>
-              <a:ext uri="{FF2B5EF4-FFF2-40B4-BE49-F238E27FC236}">
-                <a16:creationId xmlns:a16="http://schemas.microsoft.com/office/drawing/2014/main" id="{E4849DC1-2326-4C2D-D2F0-B51750BD9ABC}"/>
-              </a:ext>
-            </a:extLst>
-          </p:cNvPr>
-          <p:cNvSpPr txBox="1"/>
-          <p:nvPr/>
-        </p:nvSpPr>
-        <p:spPr>
-          <a:xfrm>
-            <a:off x="21956218" y="16265964"/>
-            <a:ext cx="1133644" cy="2215991"/>
-          </a:xfrm>
-          <a:prstGeom prst="rect">
-            <a:avLst/>
-          </a:prstGeom>
-          <a:noFill/>
-        </p:spPr>
-        <p:txBody>
-          <a:bodyPr wrap="none" rtlCol="0">
-            <a:spAutoFit/>
-          </a:bodyPr>
-          <a:lstStyle/>
-          <a:p>
-            <a:r>
-              <a:rPr lang="en-US" sz="13800" b="1" dirty="0"/>
-              <a:t>d</a:t>
             </a:r>
           </a:p>
         </p:txBody>

</xml_diff>